<commit_message>
Added an additional resource link to VS Code JS slide deck
</commit_message>
<xml_diff>
--- a/Intro to JavaScript Tooling in VS Code.pptx
+++ b/Intro to JavaScript Tooling in VS Code.pptx
@@ -7258,13 +7258,13 @@
   <p:clrMapOvr>
     <a:masterClrMapping/>
   </p:clrMapOvr>
-  <mc:AlternateContent xmlns:mc="http://schemas.openxmlformats.org/markup-compatibility/2006">
-    <mc:Choice xmlns:p14="http://schemas.microsoft.com/office/powerpoint/2010/main" Requires="p14">
+  <mc:AlternateContent xmlns:mc="http://schemas.openxmlformats.org/markup-compatibility/2006" xmlns:p14="http://schemas.microsoft.com/office/powerpoint/2010/main">
+    <mc:Choice Requires="p14">
       <p:transition p14:dur="250">
         <p:fade/>
       </p:transition>
     </mc:Choice>
-    <mc:Fallback>
+    <mc:Fallback xmlns="">
       <p:transition>
         <p:fade/>
       </p:transition>
@@ -7888,13 +7888,13 @@
   <p:clrMapOvr>
     <a:masterClrMapping/>
   </p:clrMapOvr>
-  <mc:AlternateContent xmlns:mc="http://schemas.openxmlformats.org/markup-compatibility/2006">
-    <mc:Choice xmlns:p14="http://schemas.microsoft.com/office/powerpoint/2010/main" Requires="p14">
+  <mc:AlternateContent xmlns:mc="http://schemas.openxmlformats.org/markup-compatibility/2006" xmlns:p14="http://schemas.microsoft.com/office/powerpoint/2010/main">
+    <mc:Choice Requires="p14">
       <p:transition p14:dur="250">
         <p:fade/>
       </p:transition>
     </mc:Choice>
-    <mc:Fallback>
+    <mc:Fallback xmlns="">
       <p:transition>
         <p:fade/>
       </p:transition>
@@ -8201,13 +8201,7 @@
               <a:rPr lang="en-US" sz="4400" dirty="0" smtClean="0">
                 <a:latin typeface="Lucida Console" panose="020B0609040504020204" pitchFamily="49" charset="0"/>
               </a:rPr>
-              <a:t>let demo =    + </a:t>
-            </a:r>
-            <a:r>
-              <a:rPr lang="en-US" sz="4400" dirty="0" smtClean="0">
-                <a:latin typeface="Lucida Console" panose="020B0609040504020204" pitchFamily="49" charset="0"/>
-              </a:rPr>
-              <a:t>  ;</a:t>
+              <a:t>let demo =    +   ;</a:t>
             </a:r>
             <a:endParaRPr lang="en-US" sz="4400" dirty="0">
               <a:latin typeface="Lucida Console" panose="020B0609040504020204" pitchFamily="49" charset="0"/>
@@ -8260,11 +8254,7 @@
           <a:p>
             <a:r>
               <a:rPr lang="en-US" dirty="0" smtClean="0"/>
-              <a:t>Using </a:t>
-            </a:r>
-            <a:r>
-              <a:rPr lang="en-US" dirty="0" smtClean="0"/>
-              <a:t>VS Code for JavaScript Development</a:t>
+              <a:t>Using VS Code for JavaScript Development</a:t>
             </a:r>
             <a:endParaRPr lang="en-US" dirty="0"/>
           </a:p>
@@ -8332,7 +8322,7 @@
           <p:nvPr/>
         </p:nvPicPr>
         <p:blipFill>
-          <a:blip r:embed="rId3">
+          <a:blip r:embed="rId3" cstate="print">
             <a:extLst>
               <a:ext uri="{28A0092B-C50C-407E-A947-70E740481C1C}">
                 <a14:useLocalDpi xmlns:a14="http://schemas.microsoft.com/office/drawing/2010/main" val="0"/>
@@ -8504,7 +8494,6 @@
               <a:rPr lang="en-US" dirty="0" smtClean="0"/>
               <a:t>Scan QR for slides:</a:t>
             </a:r>
-            <a:endParaRPr lang="en-US" dirty="0" smtClean="0"/>
           </a:p>
         </p:txBody>
       </p:sp>
@@ -8532,25 +8521,7 @@
               <a:rPr lang="en-US" dirty="0" smtClean="0">
                 <a:hlinkClick r:id="rId3"/>
               </a:rPr>
-              <a:t>Official </a:t>
-            </a:r>
-            <a:r>
-              <a:rPr lang="en-US" dirty="0" smtClean="0">
-                <a:hlinkClick r:id="rId3"/>
-              </a:rPr>
-              <a:t>VS Code</a:t>
-            </a:r>
-            <a:r>
-              <a:rPr lang="en-US" dirty="0" smtClean="0">
-                <a:hlinkClick r:id="rId3"/>
-              </a:rPr>
-              <a:t> </a:t>
-            </a:r>
-            <a:r>
-              <a:rPr lang="en-US" dirty="0" smtClean="0">
-                <a:hlinkClick r:id="rId3"/>
-              </a:rPr>
-              <a:t>website</a:t>
+              <a:t>Official VS Code website</a:t>
             </a:r>
             <a:endParaRPr lang="en-US" dirty="0" smtClean="0">
               <a:hlinkClick r:id="rId4"/>
@@ -8566,13 +8537,7 @@
               <a:rPr lang="en-US" dirty="0" smtClean="0">
                 <a:hlinkClick r:id="rId5"/>
               </a:rPr>
-              <a:t>VS Code </a:t>
-            </a:r>
-            <a:r>
-              <a:rPr lang="en-US" dirty="0" smtClean="0">
-                <a:hlinkClick r:id="rId5"/>
-              </a:rPr>
-              <a:t>Docs</a:t>
+              <a:t>VS Code Docs</a:t>
             </a:r>
             <a:endParaRPr lang="en-US" dirty="0" smtClean="0">
               <a:hlinkClick r:id="rId4"/>
@@ -8599,11 +8564,39 @@
             <a:pPr lvl="1"/>
             <a:r>
               <a:rPr lang="en-US" dirty="0"/>
-              <a:t>John Papa, Pluralsight </a:t>
+              <a:t>John Papa, </a:t>
+            </a:r>
+            <a:r>
+              <a:rPr lang="en-US" dirty="0" err="1"/>
+              <a:t>Pluralsight</a:t>
+            </a:r>
+            <a:r>
+              <a:rPr lang="en-US" dirty="0"/>
+              <a:t> </a:t>
             </a:r>
             <a:r>
               <a:rPr lang="en-US" dirty="0" smtClean="0"/>
               <a:t>course</a:t>
+            </a:r>
+          </a:p>
+          <a:p>
+            <a:pPr lvl="1"/>
+            <a:endParaRPr lang="en-US" dirty="0"/>
+          </a:p>
+          <a:p>
+            <a:r>
+              <a:rPr lang="en-US" dirty="0" smtClean="0">
+                <a:hlinkClick r:id="rId7"/>
+              </a:rPr>
+              <a:t>VS Code ES6 Sample Project</a:t>
+            </a:r>
+            <a:endParaRPr lang="en-US" dirty="0" smtClean="0"/>
+          </a:p>
+          <a:p>
+            <a:pPr lvl="1"/>
+            <a:r>
+              <a:rPr lang="en-US" dirty="0" smtClean="0"/>
+              <a:t>GitHub repo</a:t>
             </a:r>
             <a:endParaRPr lang="en-US" dirty="0"/>
           </a:p>

</xml_diff>

<commit_message>
Last minute tweaks before presentation
</commit_message>
<xml_diff>
--- a/Intro to JavaScript Tooling in VS Code.pptx
+++ b/Intro to JavaScript Tooling in VS Code.pptx
@@ -138,7 +138,7 @@
   </p:defaultTextStyle>
   <p:extLst>
     <p:ext uri="{EFAFB233-063F-42B5-8137-9DF3F51BA10A}">
-      <p15:sldGuideLst xmlns:p15="http://schemas.microsoft.com/office/powerpoint/2012/main">
+      <p15:sldGuideLst xmlns:p15="http://schemas.microsoft.com/office/powerpoint/2012/main" xmlns="">
         <p15:guide id="1" orient="horz" pos="2160">
           <p15:clr>
             <a:srgbClr val="A4A3A4"/>
@@ -237,7 +237,7 @@
           <a:p>
             <a:fld id="{669E24BE-8A14-406C-93AE-FEDF4702362B}" type="datetimeFigureOut">
               <a:rPr lang="en-US" smtClean="0"/>
-              <a:t>11/8/2015</a:t>
+              <a:t>11/9/2015</a:t>
             </a:fld>
             <a:endParaRPr lang="en-US" dirty="0"/>
           </a:p>
@@ -1311,7 +1311,7 @@
           <a:p>
             <a:fld id="{8008D7A7-D1E9-49FE-B288-75D755D02F1B}" type="datetime1">
               <a:rPr lang="en-US" smtClean="0"/>
-              <a:t>11/8/2015</a:t>
+              <a:t>11/9/2015</a:t>
             </a:fld>
             <a:endParaRPr lang="en-US" dirty="0"/>
           </a:p>
@@ -1574,7 +1574,7 @@
           <a:p>
             <a:fld id="{565130A9-CCEE-4E49-AF50-9A9178C093F5}" type="datetime1">
               <a:rPr lang="en-US" smtClean="0"/>
-              <a:t>11/8/2015</a:t>
+              <a:t>11/9/2015</a:t>
             </a:fld>
             <a:endParaRPr lang="en-US" dirty="0"/>
           </a:p>
@@ -1900,7 +1900,7 @@
           <a:p>
             <a:fld id="{5FFEE7F5-B2E5-489A-976D-734D7F853DE3}" type="datetime1">
               <a:rPr lang="en-US" smtClean="0"/>
-              <a:t>11/8/2015</a:t>
+              <a:t>11/9/2015</a:t>
             </a:fld>
             <a:endParaRPr lang="en-US" dirty="0"/>
           </a:p>
@@ -2253,7 +2253,7 @@
           <a:p>
             <a:fld id="{1DDC5727-5F18-4B62-81B5-C092F8CCA971}" type="datetime1">
               <a:rPr lang="en-US" smtClean="0"/>
-              <a:t>11/8/2015</a:t>
+              <a:t>11/9/2015</a:t>
             </a:fld>
             <a:endParaRPr lang="en-US" dirty="0"/>
           </a:p>
@@ -2579,7 +2579,7 @@
           <a:p>
             <a:fld id="{DD7596D5-BBCA-4EE5-AC34-2F838BA68892}" type="datetime1">
               <a:rPr lang="en-US" smtClean="0"/>
-              <a:t>11/8/2015</a:t>
+              <a:t>11/9/2015</a:t>
             </a:fld>
             <a:endParaRPr lang="en-US" dirty="0"/>
           </a:p>
@@ -2984,7 +2984,7 @@
           <a:p>
             <a:fld id="{C87E594A-105F-4330-BE78-40BFD5E05FF3}" type="datetime1">
               <a:rPr lang="en-US" smtClean="0"/>
-              <a:t>11/8/2015</a:t>
+              <a:t>11/9/2015</a:t>
             </a:fld>
             <a:endParaRPr lang="en-US" dirty="0"/>
           </a:p>
@@ -3166,7 +3166,7 @@
           <a:p>
             <a:fld id="{50DAB467-0635-440B-9BC4-DA322DD73B70}" type="datetime1">
               <a:rPr lang="en-US" smtClean="0"/>
-              <a:t>11/8/2015</a:t>
+              <a:t>11/9/2015</a:t>
             </a:fld>
             <a:endParaRPr lang="en-US" dirty="0"/>
           </a:p>
@@ -3358,7 +3358,7 @@
           <a:p>
             <a:fld id="{5E48D92D-E3A5-4B10-B1FC-D041F161170C}" type="datetime1">
               <a:rPr lang="en-US" smtClean="0"/>
-              <a:t>11/8/2015</a:t>
+              <a:t>11/9/2015</a:t>
             </a:fld>
             <a:endParaRPr lang="en-US" dirty="0"/>
           </a:p>
@@ -3546,7 +3546,7 @@
           <a:p>
             <a:fld id="{834C18EA-D952-4AE1-A6E7-E6731635F9D2}" type="datetime1">
               <a:rPr lang="en-US" smtClean="0"/>
-              <a:t>11/8/2015</a:t>
+              <a:t>11/9/2015</a:t>
             </a:fld>
             <a:endParaRPr lang="en-US" dirty="0"/>
           </a:p>
@@ -3805,7 +3805,7 @@
           <a:p>
             <a:fld id="{13032A52-9E14-487A-A3FB-E00D36231CE7}" type="datetime1">
               <a:rPr lang="en-US" smtClean="0"/>
-              <a:t>11/8/2015</a:t>
+              <a:t>11/9/2015</a:t>
             </a:fld>
             <a:endParaRPr lang="en-US" dirty="0"/>
           </a:p>
@@ -4049,7 +4049,7 @@
           <a:p>
             <a:fld id="{8C5CA72F-91C6-447B-8CFD-10CC50FBFEAC}" type="datetime1">
               <a:rPr lang="en-US" smtClean="0"/>
-              <a:t>11/8/2015</a:t>
+              <a:t>11/9/2015</a:t>
             </a:fld>
             <a:endParaRPr lang="en-US" dirty="0"/>
           </a:p>
@@ -4435,7 +4435,7 @@
           <a:p>
             <a:fld id="{2CCBA931-94B6-4C88-A7AC-0B43FAFFEEC1}" type="datetime1">
               <a:rPr lang="en-US" smtClean="0"/>
-              <a:t>11/8/2015</a:t>
+              <a:t>11/9/2015</a:t>
             </a:fld>
             <a:endParaRPr lang="en-US" dirty="0"/>
           </a:p>
@@ -4570,7 +4570,7 @@
           <a:p>
             <a:fld id="{A17CC6B2-4719-4EFD-BB2D-A2C62F0625B7}" type="datetime1">
               <a:rPr lang="en-US" smtClean="0"/>
-              <a:t>11/8/2015</a:t>
+              <a:t>11/9/2015</a:t>
             </a:fld>
             <a:endParaRPr lang="en-US" dirty="0"/>
           </a:p>
@@ -4677,7 +4677,7 @@
           <a:p>
             <a:fld id="{9AC4E54B-2176-4BC1-BC54-F80551EDB034}" type="datetime1">
               <a:rPr lang="en-US" smtClean="0"/>
-              <a:t>11/8/2015</a:t>
+              <a:t>11/9/2015</a:t>
             </a:fld>
             <a:endParaRPr lang="en-US" dirty="0"/>
           </a:p>
@@ -4944,7 +4944,7 @@
           <a:p>
             <a:fld id="{F73BBE7C-717C-4AB2-A881-24835FA94B24}" type="datetime1">
               <a:rPr lang="en-US" smtClean="0"/>
-              <a:t>11/8/2015</a:t>
+              <a:t>11/9/2015</a:t>
             </a:fld>
             <a:endParaRPr lang="en-US" dirty="0"/>
           </a:p>
@@ -5219,7 +5219,7 @@
           <a:p>
             <a:fld id="{BD6C4C3D-17A3-49F5-8381-0500C8735BF2}" type="datetime1">
               <a:rPr lang="en-US" smtClean="0"/>
-              <a:t>11/8/2015</a:t>
+              <a:t>11/9/2015</a:t>
             </a:fld>
             <a:endParaRPr lang="en-US" dirty="0"/>
           </a:p>
@@ -5974,7 +5974,7 @@
           <a:p>
             <a:fld id="{1D480221-EA8F-4F92-87B7-59E96BBC3974}" type="datetime1">
               <a:rPr lang="en-US" smtClean="0"/>
-              <a:t>11/8/2015</a:t>
+              <a:t>11/9/2015</a:t>
             </a:fld>
             <a:endParaRPr lang="en-US" dirty="0"/>
           </a:p>
@@ -6678,7 +6678,7 @@
         </p:txBody>
       </p:sp>
       <mc:AlternateContent xmlns:mc="http://schemas.openxmlformats.org/markup-compatibility/2006">
-        <mc:Choice xmlns:we="http://schemas.microsoft.com/office/webextensions/webextension/2010/11" xmlns:pca="http://schemas.microsoft.com/office/powerpoint/2013/contentapp" Requires="we pca">
+        <mc:Choice xmlns:pca="http://schemas.microsoft.com/office/powerpoint/2013/contentapp" xmlns:we="http://schemas.microsoft.com/office/webextensions/webextension/2010/11" xmlns="" Requires="we pca">
           <p:graphicFrame>
             <p:nvGraphicFramePr>
               <p:cNvPr id="5" name="Content Placeholder 4" title="Code Presenter Pro"/>
@@ -6828,7 +6828,7 @@
         </p:txBody>
       </p:sp>
       <mc:AlternateContent xmlns:mc="http://schemas.openxmlformats.org/markup-compatibility/2006">
-        <mc:Choice xmlns:we="http://schemas.microsoft.com/office/webextensions/webextension/2010/11" xmlns:pca="http://schemas.microsoft.com/office/powerpoint/2013/contentapp" Requires="we pca">
+        <mc:Choice xmlns:pca="http://schemas.microsoft.com/office/powerpoint/2013/contentapp" xmlns:we="http://schemas.microsoft.com/office/webextensions/webextension/2010/11" xmlns="" Requires="we pca">
           <p:graphicFrame>
             <p:nvGraphicFramePr>
               <p:cNvPr id="5" name="Content Placeholder 4" title="Code Presenter Pro"/>
@@ -7415,11 +7415,7 @@
           <a:p>
             <a:r>
               <a:rPr lang="en-US" dirty="0" smtClean="0"/>
-              <a:t>package.json </a:t>
-            </a:r>
-            <a:r>
-              <a:rPr lang="en-US" dirty="0" smtClean="0"/>
-              <a:t>Schema Support</a:t>
+              <a:t>package.json Schema Support</a:t>
             </a:r>
             <a:endParaRPr lang="en-US" dirty="0"/>
           </a:p>
@@ -7861,7 +7857,7 @@
           <a:p>
             <a:r>
               <a:rPr lang="en-US" dirty="0" smtClean="0"/>
-              <a:t>IntelliSense</a:t>
+              <a:t>Library / Framework IntelliSense</a:t>
             </a:r>
             <a:endParaRPr lang="en-US" dirty="0"/>
           </a:p>
@@ -7903,11 +7899,7 @@
           <a:p>
             <a:r>
               <a:rPr lang="en-US" b="1" dirty="0" smtClean="0"/>
-              <a:t>Prerequisite</a:t>
-            </a:r>
-            <a:r>
-              <a:rPr lang="en-US" b="1" dirty="0" smtClean="0"/>
-              <a:t>:</a:t>
+              <a:t>Prerequisite:</a:t>
             </a:r>
             <a:r>
               <a:rPr lang="en-US" dirty="0" smtClean="0"/>
@@ -7944,14 +7936,7 @@
                 <a:latin typeface="Consolas" panose="020B0609020204030204" pitchFamily="49" charset="0"/>
                 <a:cs typeface="Consolas" panose="020B0609020204030204" pitchFamily="49" charset="0"/>
               </a:rPr>
-              <a:t>*.d.ts files provide metadata to </a:t>
-            </a:r>
-            <a:r>
-              <a:rPr lang="en-US" dirty="0" smtClean="0">
-                <a:latin typeface="Consolas" panose="020B0609020204030204" pitchFamily="49" charset="0"/>
-                <a:cs typeface="Consolas" panose="020B0609020204030204" pitchFamily="49" charset="0"/>
-              </a:rPr>
-              <a:t>editor</a:t>
+              <a:t>*.d.ts files provide metadata to editor</a:t>
             </a:r>
           </a:p>
           <a:p>
@@ -7963,10 +7948,6 @@
               </a:rPr>
               <a:t>angular.d.ts, jquery.d.ts, etc.</a:t>
             </a:r>
-            <a:endParaRPr lang="en-US" dirty="0" smtClean="0">
-              <a:latin typeface="Consolas" panose="020B0609020204030204" pitchFamily="49" charset="0"/>
-              <a:cs typeface="Consolas" panose="020B0609020204030204" pitchFamily="49" charset="0"/>
-            </a:endParaRPr>
           </a:p>
         </p:txBody>
       </p:sp>
@@ -8089,19 +8070,7 @@
           <a:p>
             <a:r>
               <a:rPr lang="en-US" dirty="0" smtClean="0"/>
-              <a:t>Enable IntelliSense </a:t>
-            </a:r>
-            <a:r>
-              <a:rPr lang="en-US" dirty="0" smtClean="0"/>
-              <a:t>via</a:t>
-            </a:r>
-            <a:r>
-              <a:rPr lang="en-US" dirty="0" smtClean="0"/>
-              <a:t> </a:t>
-            </a:r>
-            <a:r>
-              <a:rPr lang="en-US" dirty="0" smtClean="0"/>
-              <a:t>Command Shell</a:t>
+              <a:t>Enable IntelliSense via Command Shell</a:t>
             </a:r>
             <a:endParaRPr lang="en-US" dirty="0"/>
           </a:p>
@@ -8242,19 +8211,7 @@
           <a:p>
             <a:r>
               <a:rPr lang="en-US" dirty="0" smtClean="0"/>
-              <a:t>…or Enable IntelliSense </a:t>
-            </a:r>
-            <a:r>
-              <a:rPr lang="en-US" dirty="0" smtClean="0"/>
-              <a:t>via</a:t>
-            </a:r>
-            <a:r>
-              <a:rPr lang="en-US" dirty="0" smtClean="0"/>
-              <a:t> </a:t>
-            </a:r>
-            <a:r>
-              <a:rPr lang="en-US" dirty="0" smtClean="0"/>
-              <a:t>Editor</a:t>
+              <a:t>…or Enable IntelliSense via Editor</a:t>
             </a:r>
             <a:endParaRPr lang="en-US" dirty="0"/>
           </a:p>
@@ -10021,8 +9978,31 @@
           <a:p>
             <a:r>
               <a:rPr lang="en-US" dirty="0" smtClean="0"/>
-              <a:t>“isBuildCommand” property ties to Shift + Ctrl + B gesture:</a:t>
-            </a:r>
+              <a:t>“isBuildCommand” property ties to Shift + Ctrl + B </a:t>
+            </a:r>
+            <a:r>
+              <a:rPr lang="en-US" dirty="0" smtClean="0"/>
+              <a:t>gesture</a:t>
+            </a:r>
+          </a:p>
+          <a:p>
+            <a:r>
+              <a:rPr lang="en-US" dirty="0" smtClean="0"/>
+              <a:t>“</a:t>
+            </a:r>
+            <a:r>
+              <a:rPr lang="en-US" dirty="0" err="1" smtClean="0"/>
+              <a:t>isTestCommand</a:t>
+            </a:r>
+            <a:r>
+              <a:rPr lang="en-US" dirty="0" smtClean="0"/>
+              <a:t>” property ties to Shift + Ctrl + </a:t>
+            </a:r>
+            <a:r>
+              <a:rPr lang="en-US" smtClean="0"/>
+              <a:t>T gesture</a:t>
+            </a:r>
+            <a:endParaRPr lang="en-US" dirty="0" smtClean="0"/>
           </a:p>
           <a:p>
             <a:pPr lvl="1"/>
@@ -10133,7 +10113,7 @@
         </p:txBody>
       </p:sp>
       <mc:AlternateContent xmlns:mc="http://schemas.openxmlformats.org/markup-compatibility/2006">
-        <mc:Choice xmlns:we="http://schemas.microsoft.com/office/webextensions/webextension/2010/11" xmlns:pca="http://schemas.microsoft.com/office/powerpoint/2013/contentapp" Requires="we pca">
+        <mc:Choice xmlns:pca="http://schemas.microsoft.com/office/powerpoint/2013/contentapp" xmlns:we="http://schemas.microsoft.com/office/webextensions/webextension/2010/11" xmlns="" Requires="we pca">
           <p:graphicFrame>
             <p:nvGraphicFramePr>
               <p:cNvPr id="5" name="Content Placeholder 4" title="Code Presenter Pro"/>
@@ -10588,7 +10568,7 @@
         </p:txBody>
       </p:sp>
       <mc:AlternateContent xmlns:mc="http://schemas.openxmlformats.org/markup-compatibility/2006">
-        <mc:Choice xmlns:we="http://schemas.microsoft.com/office/webextensions/webextension/2010/11" xmlns:pca="http://schemas.microsoft.com/office/powerpoint/2013/contentapp" Requires="we pca">
+        <mc:Choice xmlns:pca="http://schemas.microsoft.com/office/powerpoint/2013/contentapp" xmlns:we="http://schemas.microsoft.com/office/webextensions/webextension/2010/11" xmlns="" Requires="we pca">
           <p:graphicFrame>
             <p:nvGraphicFramePr>
               <p:cNvPr id="2" name="Add-in 1" title="Code Presenter Pro"/>
@@ -12076,20 +12056,20 @@
           </a:p>
           <a:p>
             <a:r>
-              <a:rPr lang="en-US" sz="1400" dirty="0" smtClean="0"/>
+              <a:rPr lang="en-US" sz="1000" dirty="0" smtClean="0"/>
               <a:t>Quote </a:t>
             </a:r>
             <a:r>
-              <a:rPr lang="en-US" sz="1400" dirty="0"/>
+              <a:rPr lang="en-US" sz="1000" dirty="0"/>
               <a:t>retrieved from </a:t>
             </a:r>
             <a:r>
-              <a:rPr lang="en-US" sz="1400" dirty="0">
+              <a:rPr lang="en-US" sz="1000" dirty="0">
                 <a:hlinkClick r:id="rId2"/>
               </a:rPr>
               <a:t>http://tcrn.ch/1PwSw1r</a:t>
             </a:r>
-            <a:endParaRPr lang="en-US" sz="1400" dirty="0"/>
+            <a:endParaRPr lang="en-US" sz="1000" dirty="0"/>
           </a:p>
         </p:txBody>
       </p:sp>
@@ -13477,21 +13457,21 @@
                 <a:gridCol w="1976512">
                   <a:extLst>
                     <a:ext uri="{9D8B030D-6E8A-4147-A177-3AD203B41FA5}">
-                      <a16:colId xmlns:a16="http://schemas.microsoft.com/office/drawing/2014/main" val="20000"/>
+                      <a16:colId xmlns:a16="http://schemas.microsoft.com/office/drawing/2014/main" xmlns="" val="20000"/>
                     </a:ext>
                   </a:extLst>
                 </a:gridCol>
                 <a:gridCol w="4169093">
                   <a:extLst>
                     <a:ext uri="{9D8B030D-6E8A-4147-A177-3AD203B41FA5}">
-                      <a16:colId xmlns:a16="http://schemas.microsoft.com/office/drawing/2014/main" val="20001"/>
+                      <a16:colId xmlns:a16="http://schemas.microsoft.com/office/drawing/2014/main" xmlns="" val="20001"/>
                     </a:ext>
                   </a:extLst>
                 </a:gridCol>
                 <a:gridCol w="3434377">
                   <a:extLst>
                     <a:ext uri="{9D8B030D-6E8A-4147-A177-3AD203B41FA5}">
-                      <a16:colId xmlns:a16="http://schemas.microsoft.com/office/drawing/2014/main" val="20002"/>
+                      <a16:colId xmlns:a16="http://schemas.microsoft.com/office/drawing/2014/main" xmlns="" val="20002"/>
                     </a:ext>
                   </a:extLst>
                 </a:gridCol>
@@ -13541,7 +13521,7 @@
                 </a:tc>
                 <a:extLst>
                   <a:ext uri="{0D108BD9-81ED-4DB2-BD59-A6C34878D82A}">
-                    <a16:rowId xmlns:a16="http://schemas.microsoft.com/office/drawing/2014/main" val="10000"/>
+                    <a16:rowId xmlns:a16="http://schemas.microsoft.com/office/drawing/2014/main" xmlns="" val="10000"/>
                   </a:ext>
                 </a:extLst>
               </a:tr>
@@ -13590,7 +13570,7 @@
                 </a:tc>
                 <a:extLst>
                   <a:ext uri="{0D108BD9-81ED-4DB2-BD59-A6C34878D82A}">
-                    <a16:rowId xmlns:a16="http://schemas.microsoft.com/office/drawing/2014/main" val="10001"/>
+                    <a16:rowId xmlns:a16="http://schemas.microsoft.com/office/drawing/2014/main" xmlns="" val="10001"/>
                   </a:ext>
                 </a:extLst>
               </a:tr>
@@ -13643,7 +13623,7 @@
                 </a:tc>
                 <a:extLst>
                   <a:ext uri="{0D108BD9-81ED-4DB2-BD59-A6C34878D82A}">
-                    <a16:rowId xmlns:a16="http://schemas.microsoft.com/office/drawing/2014/main" val="10002"/>
+                    <a16:rowId xmlns:a16="http://schemas.microsoft.com/office/drawing/2014/main" xmlns="" val="10002"/>
                   </a:ext>
                 </a:extLst>
               </a:tr>
@@ -13704,7 +13684,7 @@
                 </a:tc>
                 <a:extLst>
                   <a:ext uri="{0D108BD9-81ED-4DB2-BD59-A6C34878D82A}">
-                    <a16:rowId xmlns:a16="http://schemas.microsoft.com/office/drawing/2014/main" val="10003"/>
+                    <a16:rowId xmlns:a16="http://schemas.microsoft.com/office/drawing/2014/main" xmlns="" val="10003"/>
                   </a:ext>
                 </a:extLst>
               </a:tr>
@@ -13757,7 +13737,7 @@
                 </a:tc>
                 <a:extLst>
                   <a:ext uri="{0D108BD9-81ED-4DB2-BD59-A6C34878D82A}">
-                    <a16:rowId xmlns:a16="http://schemas.microsoft.com/office/drawing/2014/main" val="10004"/>
+                    <a16:rowId xmlns:a16="http://schemas.microsoft.com/office/drawing/2014/main" xmlns="" val="10004"/>
                   </a:ext>
                 </a:extLst>
               </a:tr>
@@ -13838,7 +13818,7 @@
         </p:txBody>
       </p:sp>
       <mc:AlternateContent xmlns:mc="http://schemas.openxmlformats.org/markup-compatibility/2006">
-        <mc:Choice xmlns:we="http://schemas.microsoft.com/office/webextensions/webextension/2010/11" xmlns:pca="http://schemas.microsoft.com/office/powerpoint/2013/contentapp" Requires="we pca">
+        <mc:Choice xmlns:pca="http://schemas.microsoft.com/office/powerpoint/2013/contentapp" xmlns:we="http://schemas.microsoft.com/office/webextensions/webextension/2010/11" xmlns="" Requires="we pca">
           <p:graphicFrame>
             <p:nvGraphicFramePr>
               <p:cNvPr id="5" name="Content Placeholder 4" title="Code Presenter Pro"/>
@@ -13988,7 +13968,7 @@
         </p:txBody>
       </p:sp>
       <mc:AlternateContent xmlns:mc="http://schemas.openxmlformats.org/markup-compatibility/2006">
-        <mc:Choice xmlns:we="http://schemas.microsoft.com/office/webextensions/webextension/2010/11" xmlns:pca="http://schemas.microsoft.com/office/powerpoint/2013/contentapp" Requires="we pca">
+        <mc:Choice xmlns:pca="http://schemas.microsoft.com/office/powerpoint/2013/contentapp" xmlns:we="http://schemas.microsoft.com/office/webextensions/webextension/2010/11" xmlns="" Requires="we pca">
           <p:graphicFrame>
             <p:nvGraphicFramePr>
               <p:cNvPr id="5" name="Content Placeholder 4" title="Code Presenter Pro"/>
@@ -14348,7 +14328,7 @@
   <a:extraClrSchemeLst/>
   <a:extLst>
     <a:ext uri="{05A4C25C-085E-4340-85A3-A5531E510DB2}">
-      <thm15:themeFamily xmlns:thm15="http://schemas.microsoft.com/office/thememl/2012/main" name="Facet" id="{C0C680CD-088A-49FC-A102-D699147F32B2}" vid="{CFBC31BA-B70F-4F30-BCAA-4F3011E16C4D}"/>
+      <thm15:themeFamily xmlns:thm15="http://schemas.microsoft.com/office/thememl/2012/main" xmlns="" name="Facet" id="{C0C680CD-088A-49FC-A102-D699147F32B2}" vid="{CFBC31BA-B70F-4F30-BCAA-4F3011E16C4D}"/>
     </a:ext>
   </a:extLst>
 </a:theme>
@@ -14609,7 +14589,7 @@
   <a:extraClrSchemeLst/>
   <a:extLst>
     <a:ext uri="{05A4C25C-085E-4340-85A3-A5531E510DB2}">
-      <thm15:themeFamily xmlns:thm15="http://schemas.microsoft.com/office/thememl/2012/main" name="Office Theme" id="{62F939B6-93AF-4DB8-9C6B-D6C7DFDC589F}" vid="{4A3C46E8-61CC-4603-A589-7422A47A8E4A}"/>
+      <thm15:themeFamily xmlns:thm15="http://schemas.microsoft.com/office/thememl/2012/main" xmlns="" name="Office Theme" id="{62F939B6-93AF-4DB8-9C6B-D6C7DFDC589F}" vid="{4A3C46E8-61CC-4603-A589-7422A47A8E4A}"/>
     </a:ext>
   </a:extLst>
 </a:theme>

</xml_diff>